<commit_message>
Fix images in online help
</commit_message>
<xml_diff>
--- a/User Guide and Online Help/Visuals/Visuals.pptx
+++ b/User Guide and Online Help/Visuals/Visuals.pptx
@@ -297,7 +297,7 @@
             <a:fld id="{1D8BD707-D9CF-40AE-B4C6-C98DA3205C09}" type="datetimeFigureOut">
               <a:rPr lang="en-US" smtClean="0"/>
               <a:pPr/>
-              <a:t>4/13/2013</a:t>
+              <a:t>9/6/2013</a:t>
             </a:fld>
             <a:endParaRPr lang="en-US"/>
           </a:p>
@@ -464,7 +464,7 @@
             <a:fld id="{1D8BD707-D9CF-40AE-B4C6-C98DA3205C09}" type="datetimeFigureOut">
               <a:rPr lang="en-US" smtClean="0"/>
               <a:pPr/>
-              <a:t>4/13/2013</a:t>
+              <a:t>9/6/2013</a:t>
             </a:fld>
             <a:endParaRPr lang="en-US"/>
           </a:p>
@@ -641,7 +641,7 @@
             <a:fld id="{1D8BD707-D9CF-40AE-B4C6-C98DA3205C09}" type="datetimeFigureOut">
               <a:rPr lang="en-US" smtClean="0"/>
               <a:pPr/>
-              <a:t>4/13/2013</a:t>
+              <a:t>9/6/2013</a:t>
             </a:fld>
             <a:endParaRPr lang="en-US"/>
           </a:p>
@@ -808,7 +808,7 @@
             <a:fld id="{1D8BD707-D9CF-40AE-B4C6-C98DA3205C09}" type="datetimeFigureOut">
               <a:rPr lang="en-US" smtClean="0"/>
               <a:pPr/>
-              <a:t>4/13/2013</a:t>
+              <a:t>9/6/2013</a:t>
             </a:fld>
             <a:endParaRPr lang="en-US"/>
           </a:p>
@@ -1051,7 +1051,7 @@
             <a:fld id="{1D8BD707-D9CF-40AE-B4C6-C98DA3205C09}" type="datetimeFigureOut">
               <a:rPr lang="en-US" smtClean="0"/>
               <a:pPr/>
-              <a:t>4/13/2013</a:t>
+              <a:t>9/6/2013</a:t>
             </a:fld>
             <a:endParaRPr lang="en-US"/>
           </a:p>
@@ -1336,7 +1336,7 @@
             <a:fld id="{1D8BD707-D9CF-40AE-B4C6-C98DA3205C09}" type="datetimeFigureOut">
               <a:rPr lang="en-US" smtClean="0"/>
               <a:pPr/>
-              <a:t>4/13/2013</a:t>
+              <a:t>9/6/2013</a:t>
             </a:fld>
             <a:endParaRPr lang="en-US"/>
           </a:p>
@@ -1755,7 +1755,7 @@
             <a:fld id="{1D8BD707-D9CF-40AE-B4C6-C98DA3205C09}" type="datetimeFigureOut">
               <a:rPr lang="en-US" smtClean="0"/>
               <a:pPr/>
-              <a:t>4/13/2013</a:t>
+              <a:t>9/6/2013</a:t>
             </a:fld>
             <a:endParaRPr lang="en-US"/>
           </a:p>
@@ -1870,7 +1870,7 @@
             <a:fld id="{1D8BD707-D9CF-40AE-B4C6-C98DA3205C09}" type="datetimeFigureOut">
               <a:rPr lang="en-US" smtClean="0"/>
               <a:pPr/>
-              <a:t>4/13/2013</a:t>
+              <a:t>9/6/2013</a:t>
             </a:fld>
             <a:endParaRPr lang="en-US"/>
           </a:p>
@@ -1962,7 +1962,7 @@
             <a:fld id="{1D8BD707-D9CF-40AE-B4C6-C98DA3205C09}" type="datetimeFigureOut">
               <a:rPr lang="en-US" smtClean="0"/>
               <a:pPr/>
-              <a:t>4/13/2013</a:t>
+              <a:t>9/6/2013</a:t>
             </a:fld>
             <a:endParaRPr lang="en-US"/>
           </a:p>
@@ -2236,7 +2236,7 @@
             <a:fld id="{1D8BD707-D9CF-40AE-B4C6-C98DA3205C09}" type="datetimeFigureOut">
               <a:rPr lang="en-US" smtClean="0"/>
               <a:pPr/>
-              <a:t>4/13/2013</a:t>
+              <a:t>9/6/2013</a:t>
             </a:fld>
             <a:endParaRPr lang="en-US"/>
           </a:p>
@@ -2486,7 +2486,7 @@
             <a:fld id="{1D8BD707-D9CF-40AE-B4C6-C98DA3205C09}" type="datetimeFigureOut">
               <a:rPr lang="en-US" smtClean="0"/>
               <a:pPr/>
-              <a:t>4/13/2013</a:t>
+              <a:t>9/6/2013</a:t>
             </a:fld>
             <a:endParaRPr lang="en-US"/>
           </a:p>
@@ -2696,7 +2696,7 @@
             <a:fld id="{1D8BD707-D9CF-40AE-B4C6-C98DA3205C09}" type="datetimeFigureOut">
               <a:rPr lang="en-US" smtClean="0"/>
               <a:pPr/>
-              <a:t>4/13/2013</a:t>
+              <a:t>9/6/2013</a:t>
             </a:fld>
             <a:endParaRPr lang="en-US"/>
           </a:p>
@@ -5430,7 +5430,6 @@
               <a:rPr lang="en-CA" sz="2000" b="1" dirty="0" smtClean="0"/>
               <a:t>Date of file activity</a:t>
             </a:r>
-            <a:endParaRPr lang="en-CA" sz="2000" b="1" dirty="0" smtClean="0"/>
           </a:p>
         </p:txBody>
       </p:sp>
@@ -5496,7 +5495,7 @@
       </p:grpSpPr>
       <p:pic>
         <p:nvPicPr>
-          <p:cNvPr id="2" name="Picture 1" descr="IngestInProgress.png"/>
+          <p:cNvPr id="5" name="Picture 4" descr="IngestInProgress.png"/>
           <p:cNvPicPr>
             <a:picLocks noChangeAspect="1"/>
           </p:cNvPicPr>
@@ -5510,8 +5509,8 @@
         </p:blipFill>
         <p:spPr>
           <a:xfrm>
-            <a:off x="431540" y="912408"/>
-            <a:ext cx="8412381" cy="4630476"/>
+            <a:off x="439519" y="920117"/>
+            <a:ext cx="8380953" cy="4599048"/>
           </a:xfrm>
           <a:prstGeom prst="rect">
             <a:avLst/>

</xml_diff>